<commit_message>
assembly docs and assembly to gac code
</commit_message>
<xml_diff>
--- a/.NET/.NET Learning.pptx
+++ b/.NET/.NET Learning.pptx
@@ -26,12 +26,14 @@
     <p:sldId id="273" r:id="rId20"/>
     <p:sldId id="274" r:id="rId21"/>
     <p:sldId id="275" r:id="rId22"/>
-    <p:sldId id="276" r:id="rId23"/>
-    <p:sldId id="277" r:id="rId24"/>
-    <p:sldId id="278" r:id="rId25"/>
-    <p:sldId id="279" r:id="rId26"/>
-    <p:sldId id="280" r:id="rId27"/>
-    <p:sldId id="281" r:id="rId28"/>
+    <p:sldId id="277" r:id="rId23"/>
+    <p:sldId id="278" r:id="rId24"/>
+    <p:sldId id="279" r:id="rId25"/>
+    <p:sldId id="280" r:id="rId26"/>
+    <p:sldId id="281" r:id="rId27"/>
+    <p:sldId id="283" r:id="rId28"/>
+    <p:sldId id="284" r:id="rId29"/>
+    <p:sldId id="285" r:id="rId30"/>
   </p:sldIdLst>
   <p:sldSz cx="12192000" cy="6858000"/>
   <p:notesSz cx="6858000" cy="9144000"/>
@@ -287,7 +289,7 @@
           <a:p>
             <a:fld id="{3E45B34F-75F3-43CE-AB50-F3BF54CD12BB}" type="datetimeFigureOut">
               <a:rPr lang="en-IN" smtClean="0"/>
-              <a:t>22-01-2024</a:t>
+              <a:t>24-01-2024</a:t>
             </a:fld>
             <a:endParaRPr lang="en-IN"/>
           </a:p>
@@ -487,7 +489,7 @@
           <a:p>
             <a:fld id="{3E45B34F-75F3-43CE-AB50-F3BF54CD12BB}" type="datetimeFigureOut">
               <a:rPr lang="en-IN" smtClean="0"/>
-              <a:t>22-01-2024</a:t>
+              <a:t>24-01-2024</a:t>
             </a:fld>
             <a:endParaRPr lang="en-IN"/>
           </a:p>
@@ -697,7 +699,7 @@
           <a:p>
             <a:fld id="{3E45B34F-75F3-43CE-AB50-F3BF54CD12BB}" type="datetimeFigureOut">
               <a:rPr lang="en-IN" smtClean="0"/>
-              <a:t>22-01-2024</a:t>
+              <a:t>24-01-2024</a:t>
             </a:fld>
             <a:endParaRPr lang="en-IN"/>
           </a:p>
@@ -897,7 +899,7 @@
           <a:p>
             <a:fld id="{3E45B34F-75F3-43CE-AB50-F3BF54CD12BB}" type="datetimeFigureOut">
               <a:rPr lang="en-IN" smtClean="0"/>
-              <a:t>22-01-2024</a:t>
+              <a:t>24-01-2024</a:t>
             </a:fld>
             <a:endParaRPr lang="en-IN"/>
           </a:p>
@@ -1173,7 +1175,7 @@
           <a:p>
             <a:fld id="{3E45B34F-75F3-43CE-AB50-F3BF54CD12BB}" type="datetimeFigureOut">
               <a:rPr lang="en-IN" smtClean="0"/>
-              <a:t>22-01-2024</a:t>
+              <a:t>24-01-2024</a:t>
             </a:fld>
             <a:endParaRPr lang="en-IN"/>
           </a:p>
@@ -1441,7 +1443,7 @@
           <a:p>
             <a:fld id="{3E45B34F-75F3-43CE-AB50-F3BF54CD12BB}" type="datetimeFigureOut">
               <a:rPr lang="en-IN" smtClean="0"/>
-              <a:t>22-01-2024</a:t>
+              <a:t>24-01-2024</a:t>
             </a:fld>
             <a:endParaRPr lang="en-IN"/>
           </a:p>
@@ -1856,7 +1858,7 @@
           <a:p>
             <a:fld id="{3E45B34F-75F3-43CE-AB50-F3BF54CD12BB}" type="datetimeFigureOut">
               <a:rPr lang="en-IN" smtClean="0"/>
-              <a:t>22-01-2024</a:t>
+              <a:t>24-01-2024</a:t>
             </a:fld>
             <a:endParaRPr lang="en-IN"/>
           </a:p>
@@ -1998,7 +2000,7 @@
           <a:p>
             <a:fld id="{3E45B34F-75F3-43CE-AB50-F3BF54CD12BB}" type="datetimeFigureOut">
               <a:rPr lang="en-IN" smtClean="0"/>
-              <a:t>22-01-2024</a:t>
+              <a:t>24-01-2024</a:t>
             </a:fld>
             <a:endParaRPr lang="en-IN"/>
           </a:p>
@@ -2111,7 +2113,7 @@
           <a:p>
             <a:fld id="{3E45B34F-75F3-43CE-AB50-F3BF54CD12BB}" type="datetimeFigureOut">
               <a:rPr lang="en-IN" smtClean="0"/>
-              <a:t>22-01-2024</a:t>
+              <a:t>24-01-2024</a:t>
             </a:fld>
             <a:endParaRPr lang="en-IN"/>
           </a:p>
@@ -2424,7 +2426,7 @@
           <a:p>
             <a:fld id="{3E45B34F-75F3-43CE-AB50-F3BF54CD12BB}" type="datetimeFigureOut">
               <a:rPr lang="en-IN" smtClean="0"/>
-              <a:t>22-01-2024</a:t>
+              <a:t>24-01-2024</a:t>
             </a:fld>
             <a:endParaRPr lang="en-IN"/>
           </a:p>
@@ -2713,7 +2715,7 @@
           <a:p>
             <a:fld id="{3E45B34F-75F3-43CE-AB50-F3BF54CD12BB}" type="datetimeFigureOut">
               <a:rPr lang="en-IN" smtClean="0"/>
-              <a:t>22-01-2024</a:t>
+              <a:t>24-01-2024</a:t>
             </a:fld>
             <a:endParaRPr lang="en-IN"/>
           </a:p>
@@ -2956,7 +2958,7 @@
           <a:p>
             <a:fld id="{3E45B34F-75F3-43CE-AB50-F3BF54CD12BB}" type="datetimeFigureOut">
               <a:rPr lang="en-IN" smtClean="0"/>
-              <a:t>22-01-2024</a:t>
+              <a:t>24-01-2024</a:t>
             </a:fld>
             <a:endParaRPr lang="en-IN"/>
           </a:p>
@@ -3892,7 +3894,12 @@
             <p:ph idx="1"/>
           </p:nvPr>
         </p:nvSpPr>
-        <p:spPr/>
+        <p:spPr>
+          <a:xfrm>
+            <a:off x="838200" y="1825625"/>
+            <a:ext cx="10515600" cy="3334204"/>
+          </a:xfrm>
+        </p:spPr>
         <p:txBody>
           <a:bodyPr/>
           <a:lstStyle/>
@@ -4007,7 +4014,7 @@
                 <a:effectLst/>
                 <a:latin typeface="inter-regular"/>
               </a:rPr>
-              <a:t> That language's compiler compiles the source code of applications developed using .NET compliant languages into CLR's intermediate language called MSIL, i.e., Microsoft intermediate language code. This code is platform-independent. It is comparable to byte code in java.</a:t>
+              <a:t>That language's compiler compiles the source code of applications developed using .NET compliant languages into CLR's intermediate language called MSIL, i.e., Microsoft intermediate language code. This code is platform-independent. It is comparable to byte code in java.</a:t>
             </a:r>
           </a:p>
           <a:p>
@@ -4768,8 +4775,8 @@
         </p:nvSpPr>
         <p:spPr>
           <a:xfrm>
-            <a:off x="838200" y="1825625"/>
-            <a:ext cx="4495800" cy="4351338"/>
+            <a:off x="838199" y="1825625"/>
+            <a:ext cx="5543939" cy="4351338"/>
           </a:xfrm>
         </p:spPr>
         <p:txBody>
@@ -5039,7 +5046,12 @@
             <p:ph idx="1"/>
           </p:nvPr>
         </p:nvSpPr>
-        <p:spPr/>
+        <p:spPr>
+          <a:xfrm>
+            <a:off x="838200" y="1825625"/>
+            <a:ext cx="10515600" cy="2475787"/>
+          </a:xfrm>
+        </p:spPr>
         <p:txBody>
           <a:bodyPr/>
           <a:lstStyle/>
@@ -5155,6 +5167,9 @@
             </a:r>
           </a:p>
           <a:p>
+            <a:pPr marL="0" indent="0">
+              <a:buNone/>
+            </a:pPr>
             <a:endParaRPr lang="en-US" dirty="0"/>
           </a:p>
           <a:p>
@@ -5169,6 +5184,12 @@
             <a:r>
               <a:rPr lang="en-US" dirty="0"/>
               <a:t> plays a crucial role in managing the transition between the two environments. </a:t>
+            </a:r>
+          </a:p>
+          <a:p>
+            <a:r>
+              <a:rPr lang="en-US" dirty="0"/>
+              <a:t>Unmanaged code -  requires only one complication code</a:t>
             </a:r>
             <a:endParaRPr lang="en-IN" dirty="0"/>
           </a:p>
@@ -5296,7 +5317,7 @@
           <p:cNvPr id="2" name="Title 1">
             <a:extLst>
               <a:ext uri="{FF2B5EF4-FFF2-40B4-BE49-F238E27FC236}">
-                <a16:creationId xmlns:a16="http://schemas.microsoft.com/office/drawing/2014/main" id="{06B8178D-56BE-F704-4A19-FC3FB70B85F2}"/>
+                <a16:creationId xmlns:a16="http://schemas.microsoft.com/office/drawing/2014/main" id="{241887D4-FF0C-2993-09B1-129FB0DEA435}"/>
               </a:ext>
             </a:extLst>
           </p:cNvPr>
@@ -5314,7 +5335,7 @@
           <a:p>
             <a:r>
               <a:rPr lang="en-IN" dirty="0"/>
-              <a:t>Debug Engine</a:t>
+              <a:t>Type Checker</a:t>
             </a:r>
           </a:p>
         </p:txBody>
@@ -5324,7 +5345,7 @@
           <p:cNvPr id="3" name="Content Placeholder 2">
             <a:extLst>
               <a:ext uri="{FF2B5EF4-FFF2-40B4-BE49-F238E27FC236}">
-                <a16:creationId xmlns:a16="http://schemas.microsoft.com/office/drawing/2014/main" id="{B5B694C1-4220-985A-D4B3-4367C416F65A}"/>
+                <a16:creationId xmlns:a16="http://schemas.microsoft.com/office/drawing/2014/main" id="{FA175EA6-B71F-50B6-406B-658ED16489E0}"/>
               </a:ext>
             </a:extLst>
           </p:cNvPr>
@@ -5341,40 +5362,8 @@
           <a:lstStyle/>
           <a:p>
             <a:r>
-              <a:rPr lang="en-IN" dirty="0"/>
-              <a:t>It allows you to debug different kinds of applications.</a:t>
-            </a:r>
-          </a:p>
-          <a:p>
-            <a:r>
-              <a:rPr lang="en-US" b="0" i="0" dirty="0">
-                <a:solidFill>
-                  <a:srgbClr val="273239"/>
-                </a:solidFill>
-                <a:effectLst/>
-                <a:latin typeface="Nunito" pitchFamily="2" charset="0"/>
-              </a:rPr>
-              <a:t>An application can be debugged during the run-time using the debug engine. There are various </a:t>
-            </a:r>
-            <a:r>
-              <a:rPr lang="en-US" b="0" i="0" dirty="0" err="1">
-                <a:solidFill>
-                  <a:srgbClr val="273239"/>
-                </a:solidFill>
-                <a:effectLst/>
-                <a:latin typeface="Nunito" pitchFamily="2" charset="0"/>
-              </a:rPr>
-              <a:t>ICorDebug</a:t>
-            </a:r>
-            <a:r>
-              <a:rPr lang="en-US" b="0" i="0" dirty="0">
-                <a:solidFill>
-                  <a:srgbClr val="273239"/>
-                </a:solidFill>
-                <a:effectLst/>
-                <a:latin typeface="Nunito" pitchFamily="2" charset="0"/>
-              </a:rPr>
-              <a:t> interfaces that are used to track the managed code of the application that is being debugged.</a:t>
+              <a:rPr lang="en-US" dirty="0"/>
+              <a:t>Type safety is provided by the type checker by using the Common Type System (CTS) and the Common Language Specification (CLS) that are provided in the CLR to verify the types that are used in an application.</a:t>
             </a:r>
             <a:endParaRPr lang="en-IN" dirty="0"/>
           </a:p>
@@ -5383,7 +5372,7 @@
     </p:spTree>
     <p:extLst>
       <p:ext uri="{BB962C8B-B14F-4D97-AF65-F5344CB8AC3E}">
-        <p14:creationId xmlns:p14="http://schemas.microsoft.com/office/powerpoint/2010/main" val="4163978644"/>
+        <p14:creationId xmlns:p14="http://schemas.microsoft.com/office/powerpoint/2010/main" val="872435911"/>
       </p:ext>
     </p:extLst>
   </p:cSld>
@@ -5415,7 +5404,7 @@
           <p:cNvPr id="2" name="Title 1">
             <a:extLst>
               <a:ext uri="{FF2B5EF4-FFF2-40B4-BE49-F238E27FC236}">
-                <a16:creationId xmlns:a16="http://schemas.microsoft.com/office/drawing/2014/main" id="{241887D4-FF0C-2993-09B1-129FB0DEA435}"/>
+                <a16:creationId xmlns:a16="http://schemas.microsoft.com/office/drawing/2014/main" id="{29F45B83-6170-A244-8E54-D4A88BA6B0CA}"/>
               </a:ext>
             </a:extLst>
           </p:cNvPr>
@@ -5433,7 +5422,7 @@
           <a:p>
             <a:r>
               <a:rPr lang="en-IN" dirty="0"/>
-              <a:t>Type Checker</a:t>
+              <a:t>Code Manager</a:t>
             </a:r>
           </a:p>
         </p:txBody>
@@ -5443,7 +5432,7 @@
           <p:cNvPr id="3" name="Content Placeholder 2">
             <a:extLst>
               <a:ext uri="{FF2B5EF4-FFF2-40B4-BE49-F238E27FC236}">
-                <a16:creationId xmlns:a16="http://schemas.microsoft.com/office/drawing/2014/main" id="{FA175EA6-B71F-50B6-406B-658ED16489E0}"/>
+                <a16:creationId xmlns:a16="http://schemas.microsoft.com/office/drawing/2014/main" id="{F4539EE5-2669-64F9-6A65-6F539A8F1F36}"/>
               </a:ext>
             </a:extLst>
           </p:cNvPr>
@@ -5460,8 +5449,20 @@
           <a:lstStyle/>
           <a:p>
             <a:r>
-              <a:rPr lang="en-US" dirty="0"/>
-              <a:t>Type safety is provided by the type checker by using the Common Type System (CTS) and the Common Language Specification (CLS) that are provided in the CLR to verify the types that are used in an application.</a:t>
+              <a:rPr lang="en-IN" dirty="0"/>
+              <a:t>It manages code at execution runtime.</a:t>
+            </a:r>
+          </a:p>
+          <a:p>
+            <a:r>
+              <a:rPr lang="en-US" b="0" i="0" dirty="0">
+                <a:solidFill>
+                  <a:srgbClr val="273239"/>
+                </a:solidFill>
+                <a:effectLst/>
+                <a:latin typeface="Nunito" pitchFamily="2" charset="0"/>
+              </a:rPr>
+              <a:t>The code manager in CLR manages the code developed in the .NET framework i.e. the managed code. The managed code is converted to intermediate language by a language-specific compiler and then the intermediate language is converted into the machine code by the Just-In-Time (JIT) compiler.</a:t>
             </a:r>
             <a:endParaRPr lang="en-IN" dirty="0"/>
           </a:p>
@@ -5470,7 +5471,7 @@
     </p:spTree>
     <p:extLst>
       <p:ext uri="{BB962C8B-B14F-4D97-AF65-F5344CB8AC3E}">
-        <p14:creationId xmlns:p14="http://schemas.microsoft.com/office/powerpoint/2010/main" val="872435911"/>
+        <p14:creationId xmlns:p14="http://schemas.microsoft.com/office/powerpoint/2010/main" val="1943813289"/>
       </p:ext>
     </p:extLst>
   </p:cSld>
@@ -5502,7 +5503,7 @@
           <p:cNvPr id="2" name="Title 1">
             <a:extLst>
               <a:ext uri="{FF2B5EF4-FFF2-40B4-BE49-F238E27FC236}">
-                <a16:creationId xmlns:a16="http://schemas.microsoft.com/office/drawing/2014/main" id="{29F45B83-6170-A244-8E54-D4A88BA6B0CA}"/>
+                <a16:creationId xmlns:a16="http://schemas.microsoft.com/office/drawing/2014/main" id="{3D09BBAE-255B-2E08-305C-E9CE9F06E46D}"/>
               </a:ext>
             </a:extLst>
           </p:cNvPr>
@@ -5520,7 +5521,7 @@
           <a:p>
             <a:r>
               <a:rPr lang="en-IN" dirty="0"/>
-              <a:t>Code Manager</a:t>
+              <a:t>Garbage Collector</a:t>
             </a:r>
           </a:p>
         </p:txBody>
@@ -5530,7 +5531,7 @@
           <p:cNvPr id="3" name="Content Placeholder 2">
             <a:extLst>
               <a:ext uri="{FF2B5EF4-FFF2-40B4-BE49-F238E27FC236}">
-                <a16:creationId xmlns:a16="http://schemas.microsoft.com/office/drawing/2014/main" id="{F4539EE5-2669-64F9-6A65-6F539A8F1F36}"/>
+                <a16:creationId xmlns:a16="http://schemas.microsoft.com/office/drawing/2014/main" id="{C74D135C-01CA-8AE7-EA91-8D4CB7DDFE79}"/>
               </a:ext>
             </a:extLst>
           </p:cNvPr>
@@ -5548,7 +5549,7 @@
           <a:p>
             <a:r>
               <a:rPr lang="en-IN" dirty="0"/>
-              <a:t>It manages code at execution runtime.</a:t>
+              <a:t>It releases the unused memory and allocates it to a new applications. </a:t>
             </a:r>
           </a:p>
           <a:p>
@@ -5560,7 +5561,7 @@
                 <a:effectLst/>
                 <a:latin typeface="Nunito" pitchFamily="2" charset="0"/>
               </a:rPr>
-              <a:t>The code manager in CLR manages the code developed in the .NET framework i.e. the managed code. The managed code is converted to intermediate language by a language-specific compiler and then the intermediate language is converted into the machine code by the Just-In-Time (JIT) compiler.</a:t>
+              <a:t>Automatic memory management is made possible using the garbage collector in CLR. The garbage collector automatically releases the memory space after it is no longer required so that it can be reallocated.</a:t>
             </a:r>
             <a:endParaRPr lang="en-IN" dirty="0"/>
           </a:p>
@@ -5569,7 +5570,7 @@
     </p:spTree>
     <p:extLst>
       <p:ext uri="{BB962C8B-B14F-4D97-AF65-F5344CB8AC3E}">
-        <p14:creationId xmlns:p14="http://schemas.microsoft.com/office/powerpoint/2010/main" val="1943813289"/>
+        <p14:creationId xmlns:p14="http://schemas.microsoft.com/office/powerpoint/2010/main" val="904593117"/>
       </p:ext>
     </p:extLst>
   </p:cSld>
@@ -5601,7 +5602,7 @@
           <p:cNvPr id="2" name="Title 1">
             <a:extLst>
               <a:ext uri="{FF2B5EF4-FFF2-40B4-BE49-F238E27FC236}">
-                <a16:creationId xmlns:a16="http://schemas.microsoft.com/office/drawing/2014/main" id="{3D09BBAE-255B-2E08-305C-E9CE9F06E46D}"/>
+                <a16:creationId xmlns:a16="http://schemas.microsoft.com/office/drawing/2014/main" id="{8F34DEBD-5EFC-9012-7D20-6ADB3D68EBB7}"/>
               </a:ext>
             </a:extLst>
           </p:cNvPr>
@@ -5619,7 +5620,7 @@
           <a:p>
             <a:r>
               <a:rPr lang="en-IN" dirty="0"/>
-              <a:t>Garbage Collector</a:t>
+              <a:t>Exception Handler</a:t>
             </a:r>
           </a:p>
         </p:txBody>
@@ -5629,7 +5630,7 @@
           <p:cNvPr id="3" name="Content Placeholder 2">
             <a:extLst>
               <a:ext uri="{FF2B5EF4-FFF2-40B4-BE49-F238E27FC236}">
-                <a16:creationId xmlns:a16="http://schemas.microsoft.com/office/drawing/2014/main" id="{C74D135C-01CA-8AE7-EA91-8D4CB7DDFE79}"/>
+                <a16:creationId xmlns:a16="http://schemas.microsoft.com/office/drawing/2014/main" id="{A27730DE-ADA8-46B3-04FF-65A1F7DEB57C}"/>
               </a:ext>
             </a:extLst>
           </p:cNvPr>
@@ -5647,7 +5648,7 @@
           <a:p>
             <a:r>
               <a:rPr lang="en-IN" dirty="0"/>
-              <a:t>It releases the unused memory and allocates it to a new applications. </a:t>
+              <a:t>It handles the exception to runtime to avoid application failure.</a:t>
             </a:r>
           </a:p>
           <a:p>
@@ -5659,7 +5660,27 @@
                 <a:effectLst/>
                 <a:latin typeface="Nunito" pitchFamily="2" charset="0"/>
               </a:rPr>
-              <a:t>Automatic memory management is made possible using the garbage collector in CLR. The garbage collector automatically releases the memory space after it is no longer required so that it can be reallocated.</a:t>
+              <a:t>The exception manager in the CLR handles the exceptions regardless of the </a:t>
+            </a:r>
+            <a:r>
+              <a:rPr lang="en-US" b="0" i="1" dirty="0">
+                <a:solidFill>
+                  <a:srgbClr val="273239"/>
+                </a:solidFill>
+                <a:effectLst/>
+                <a:latin typeface="Nunito" pitchFamily="2" charset="0"/>
+              </a:rPr>
+              <a:t>.NET Language</a:t>
+            </a:r>
+            <a:r>
+              <a:rPr lang="en-US" b="0" i="0" dirty="0">
+                <a:solidFill>
+                  <a:srgbClr val="273239"/>
+                </a:solidFill>
+                <a:effectLst/>
+                <a:latin typeface="Nunito" pitchFamily="2" charset="0"/>
+              </a:rPr>
+              <a:t> that created them. For a particular application, the catch block of the exceptions are executed in case they occur and if there is no catch block then the application is terminated.</a:t>
             </a:r>
             <a:endParaRPr lang="en-IN" dirty="0"/>
           </a:p>
@@ -5668,7 +5689,7 @@
     </p:spTree>
     <p:extLst>
       <p:ext uri="{BB962C8B-B14F-4D97-AF65-F5344CB8AC3E}">
-        <p14:creationId xmlns:p14="http://schemas.microsoft.com/office/powerpoint/2010/main" val="904593117"/>
+        <p14:creationId xmlns:p14="http://schemas.microsoft.com/office/powerpoint/2010/main" val="2469541335"/>
       </p:ext>
     </p:extLst>
   </p:cSld>
@@ -5700,7 +5721,7 @@
           <p:cNvPr id="2" name="Title 1">
             <a:extLst>
               <a:ext uri="{FF2B5EF4-FFF2-40B4-BE49-F238E27FC236}">
-                <a16:creationId xmlns:a16="http://schemas.microsoft.com/office/drawing/2014/main" id="{8F34DEBD-5EFC-9012-7D20-6ADB3D68EBB7}"/>
+                <a16:creationId xmlns:a16="http://schemas.microsoft.com/office/drawing/2014/main" id="{179EE7F9-DC58-B7C2-333C-2B4775EE3071}"/>
               </a:ext>
             </a:extLst>
           </p:cNvPr>
@@ -5717,9 +5738,10 @@
           <a:lstStyle/>
           <a:p>
             <a:r>
-              <a:rPr lang="en-IN" dirty="0"/>
-              <a:t>Exception Handler</a:t>
-            </a:r>
+              <a:rPr lang="en-IN" dirty="0" err="1"/>
+              <a:t>ClassLoader</a:t>
+            </a:r>
+            <a:endParaRPr lang="en-IN" dirty="0"/>
           </a:p>
         </p:txBody>
       </p:sp>
@@ -5728,7 +5750,7 @@
           <p:cNvPr id="3" name="Content Placeholder 2">
             <a:extLst>
               <a:ext uri="{FF2B5EF4-FFF2-40B4-BE49-F238E27FC236}">
-                <a16:creationId xmlns:a16="http://schemas.microsoft.com/office/drawing/2014/main" id="{A27730DE-ADA8-46B3-04FF-65A1F7DEB57C}"/>
+                <a16:creationId xmlns:a16="http://schemas.microsoft.com/office/drawing/2014/main" id="{3036105B-7819-596F-D84D-8EE34DE16DB4}"/>
               </a:ext>
             </a:extLst>
           </p:cNvPr>
@@ -5746,10 +5768,20 @@
           <a:p>
             <a:r>
               <a:rPr lang="en-IN" dirty="0"/>
-              <a:t>It handles the exception to runtime to avoid application failure.</a:t>
-            </a:r>
-          </a:p>
-          <a:p>
+              <a:t>It is used to load all classes at runtime.</a:t>
+            </a:r>
+          </a:p>
+          <a:p>
+            <a:r>
+              <a:rPr lang="en-US" b="1" i="0" dirty="0">
+                <a:solidFill>
+                  <a:srgbClr val="273239"/>
+                </a:solidFill>
+                <a:effectLst/>
+                <a:latin typeface="Nunito" pitchFamily="2" charset="0"/>
+              </a:rPr>
+              <a:t> </a:t>
+            </a:r>
             <a:r>
               <a:rPr lang="en-US" b="0" i="0" dirty="0">
                 <a:solidFill>
@@ -5758,27 +5790,7 @@
                 <a:effectLst/>
                 <a:latin typeface="Nunito" pitchFamily="2" charset="0"/>
               </a:rPr>
-              <a:t>The exception manager in the CLR handles the exceptions regardless of the </a:t>
-            </a:r>
-            <a:r>
-              <a:rPr lang="en-US" b="0" i="1" dirty="0">
-                <a:solidFill>
-                  <a:srgbClr val="273239"/>
-                </a:solidFill>
-                <a:effectLst/>
-                <a:latin typeface="Nunito" pitchFamily="2" charset="0"/>
-              </a:rPr>
-              <a:t>.NET Language</a:t>
-            </a:r>
-            <a:r>
-              <a:rPr lang="en-US" b="0" i="0" dirty="0">
-                <a:solidFill>
-                  <a:srgbClr val="273239"/>
-                </a:solidFill>
-                <a:effectLst/>
-                <a:latin typeface="Nunito" pitchFamily="2" charset="0"/>
-              </a:rPr>
-              <a:t> that created them. For a particular application, the catch block of the exceptions are executed in case they occur and if there is no catch block then the application is terminated.</a:t>
+              <a:t>Various modules, resources, assemblies, etc. are loaded by the CLR loader. Also, this loader loads the modules on demand if they are actually required so that the program initialization time is faster and the resources consumed are lesser.</a:t>
             </a:r>
             <a:endParaRPr lang="en-IN" dirty="0"/>
           </a:p>
@@ -5787,7 +5799,7 @@
     </p:spTree>
     <p:extLst>
       <p:ext uri="{BB962C8B-B14F-4D97-AF65-F5344CB8AC3E}">
-        <p14:creationId xmlns:p14="http://schemas.microsoft.com/office/powerpoint/2010/main" val="2469541335"/>
+        <p14:creationId xmlns:p14="http://schemas.microsoft.com/office/powerpoint/2010/main" val="990868121"/>
       </p:ext>
     </p:extLst>
   </p:cSld>
@@ -5819,7 +5831,7 @@
           <p:cNvPr id="2" name="Title 1">
             <a:extLst>
               <a:ext uri="{FF2B5EF4-FFF2-40B4-BE49-F238E27FC236}">
-                <a16:creationId xmlns:a16="http://schemas.microsoft.com/office/drawing/2014/main" id="{179EE7F9-DC58-B7C2-333C-2B4775EE3071}"/>
+                <a16:creationId xmlns:a16="http://schemas.microsoft.com/office/drawing/2014/main" id="{1C7514ED-98A1-8AC8-D44B-BF8BEB622E5B}"/>
               </a:ext>
             </a:extLst>
           </p:cNvPr>
@@ -5836,8 +5848,8 @@
           <a:lstStyle/>
           <a:p>
             <a:r>
-              <a:rPr lang="en-IN" dirty="0" err="1"/>
-              <a:t>ClassLoader</a:t>
+              <a:rPr lang="en-US" dirty="0"/>
+              <a:t>Build/ Rebuild/clean</a:t>
             </a:r>
             <a:endParaRPr lang="en-IN" dirty="0"/>
           </a:p>
@@ -5848,7 +5860,7 @@
           <p:cNvPr id="3" name="Content Placeholder 2">
             <a:extLst>
               <a:ext uri="{FF2B5EF4-FFF2-40B4-BE49-F238E27FC236}">
-                <a16:creationId xmlns:a16="http://schemas.microsoft.com/office/drawing/2014/main" id="{3036105B-7819-596F-D84D-8EE34DE16DB4}"/>
+                <a16:creationId xmlns:a16="http://schemas.microsoft.com/office/drawing/2014/main" id="{54FD9857-3C9F-D0AA-D97B-AF7025EE7B55}"/>
               </a:ext>
             </a:extLst>
           </p:cNvPr>
@@ -5861,34 +5873,107 @@
         </p:nvSpPr>
         <p:spPr/>
         <p:txBody>
-          <a:bodyPr/>
-          <a:lstStyle/>
-          <a:p>
-            <a:r>
-              <a:rPr lang="en-IN" dirty="0"/>
-              <a:t>It is used to load all classes at runtime.</a:t>
-            </a:r>
-          </a:p>
-          <a:p>
-            <a:r>
-              <a:rPr lang="en-US" b="1" i="0" dirty="0">
-                <a:solidFill>
-                  <a:srgbClr val="273239"/>
-                </a:solidFill>
-                <a:effectLst/>
-                <a:latin typeface="Nunito" pitchFamily="2" charset="0"/>
-              </a:rPr>
-              <a:t> </a:t>
-            </a:r>
-            <a:r>
-              <a:rPr lang="en-US" b="0" i="0" dirty="0">
-                <a:solidFill>
-                  <a:srgbClr val="273239"/>
-                </a:solidFill>
-                <a:effectLst/>
-                <a:latin typeface="Nunito" pitchFamily="2" charset="0"/>
-              </a:rPr>
-              <a:t>Various modules, resources, assemblies, etc. are loaded by the CLR loader. Also, this loader loads the modules on demand if they are actually required so that the program initialization time is faster and the resources consumed are lesser.</a:t>
+          <a:bodyPr>
+            <a:normAutofit fontScale="47500" lnSpcReduction="20000"/>
+          </a:bodyPr>
+          <a:lstStyle/>
+          <a:p>
+            <a:pPr marL="0" indent="0">
+              <a:buNone/>
+            </a:pPr>
+            <a:r>
+              <a:rPr lang="en-US" dirty="0"/>
+              <a:t>Build:</a:t>
+            </a:r>
+          </a:p>
+          <a:p>
+            <a:endParaRPr lang="en-US" dirty="0"/>
+          </a:p>
+          <a:p>
+            <a:pPr marL="0" indent="0">
+              <a:buNone/>
+            </a:pPr>
+            <a:r>
+              <a:rPr lang="en-US" dirty="0"/>
+              <a:t>Purpose: The "Build" option compiles the source code that has changed since the last build. It performs an incremental build, meaning it only compiles the files that have been modified or added since the last successful build.</a:t>
+            </a:r>
+          </a:p>
+          <a:p>
+            <a:pPr marL="0" indent="0">
+              <a:buNone/>
+            </a:pPr>
+            <a:r>
+              <a:rPr lang="en-US" dirty="0"/>
+              <a:t>Result: The compiled output is updated in the "bin" directory, and only files that have changed are recompiled.</a:t>
+            </a:r>
+          </a:p>
+          <a:p>
+            <a:pPr marL="0" indent="0">
+              <a:buNone/>
+            </a:pPr>
+            <a:endParaRPr lang="en-US" dirty="0"/>
+          </a:p>
+          <a:p>
+            <a:pPr marL="0" indent="0">
+              <a:buNone/>
+            </a:pPr>
+            <a:r>
+              <a:rPr lang="en-US" dirty="0"/>
+              <a:t>Rebuild:</a:t>
+            </a:r>
+          </a:p>
+          <a:p>
+            <a:endParaRPr lang="en-US" dirty="0"/>
+          </a:p>
+          <a:p>
+            <a:pPr marL="0" indent="0">
+              <a:buNone/>
+            </a:pPr>
+            <a:r>
+              <a:rPr lang="en-US" dirty="0"/>
+              <a:t>Purpose: The "Rebuild" option is more comprehensive. It cleans the entire project, removing all previously compiled files (including those in the "bin" and "obj" directories), and then rebuilds the entire project from scratch.</a:t>
+            </a:r>
+          </a:p>
+          <a:p>
+            <a:pPr marL="0" indent="0">
+              <a:buNone/>
+            </a:pPr>
+            <a:r>
+              <a:rPr lang="en-US" dirty="0"/>
+              <a:t>Result: The entire project is recompiled regardless of whether files have changed or not. It ensures a clean build by starting the compilation process anew.</a:t>
+            </a:r>
+          </a:p>
+          <a:p>
+            <a:pPr marL="0" indent="0">
+              <a:buNone/>
+            </a:pPr>
+            <a:endParaRPr lang="en-US" dirty="0"/>
+          </a:p>
+          <a:p>
+            <a:pPr marL="0" indent="0">
+              <a:buNone/>
+            </a:pPr>
+            <a:r>
+              <a:rPr lang="en-US" dirty="0"/>
+              <a:t>Clean:</a:t>
+            </a:r>
+          </a:p>
+          <a:p>
+            <a:pPr marL="0" indent="0">
+              <a:buNone/>
+            </a:pPr>
+            <a:r>
+              <a:rPr lang="en-US" dirty="0"/>
+              <a:t>Purpose: The "Clean" option is different from "Rebuild" in that it cleans the project by removing all previously compiled files (both in the "bin" and "obj" directories) without initiating a build.</a:t>
+            </a:r>
+          </a:p>
+          <a:p>
+            <a:pPr marL="0" indent="0">
+              <a:buNone/>
+            </a:pPr>
+            <a:r>
+              <a:rPr lang="en-US" dirty="0"/>
+              <a:t>Result: It deletes all previously compiled files, leaving the project in a state as if it hasn't been built. Subsequent builds will then recompile the entire project.</a:t>
             </a:r>
             <a:endParaRPr lang="en-IN" dirty="0"/>
           </a:p>
@@ -5897,7 +5982,209 @@
     </p:spTree>
     <p:extLst>
       <p:ext uri="{BB962C8B-B14F-4D97-AF65-F5344CB8AC3E}">
-        <p14:creationId xmlns:p14="http://schemas.microsoft.com/office/powerpoint/2010/main" val="990868121"/>
+        <p14:creationId xmlns:p14="http://schemas.microsoft.com/office/powerpoint/2010/main" val="1351427258"/>
+      </p:ext>
+    </p:extLst>
+  </p:cSld>
+  <p:clrMapOvr>
+    <a:masterClrMapping/>
+  </p:clrMapOvr>
+</p:sld>
+</file>
+
+<file path=ppt/slides/slide28.xml><?xml version="1.0" encoding="utf-8"?>
+<p:sld xmlns:a="http://schemas.openxmlformats.org/drawingml/2006/main" xmlns:r="http://schemas.openxmlformats.org/officeDocument/2006/relationships" xmlns:p="http://schemas.openxmlformats.org/presentationml/2006/main">
+  <p:cSld>
+    <p:spTree>
+      <p:nvGrpSpPr>
+        <p:cNvPr id="1" name=""/>
+        <p:cNvGrpSpPr/>
+        <p:nvPr/>
+      </p:nvGrpSpPr>
+      <p:grpSpPr>
+        <a:xfrm>
+          <a:off x="0" y="0"/>
+          <a:ext cx="0" cy="0"/>
+          <a:chOff x="0" y="0"/>
+          <a:chExt cx="0" cy="0"/>
+        </a:xfrm>
+      </p:grpSpPr>
+      <p:sp>
+        <p:nvSpPr>
+          <p:cNvPr id="2" name="Title 1">
+            <a:extLst>
+              <a:ext uri="{FF2B5EF4-FFF2-40B4-BE49-F238E27FC236}">
+                <a16:creationId xmlns:a16="http://schemas.microsoft.com/office/drawing/2014/main" id="{E4A2D7DE-22AC-3A5C-0456-DFA5B19332EA}"/>
+              </a:ext>
+            </a:extLst>
+          </p:cNvPr>
+          <p:cNvSpPr>
+            <a:spLocks noGrp="1"/>
+          </p:cNvSpPr>
+          <p:nvPr>
+            <p:ph type="title"/>
+          </p:nvPr>
+        </p:nvSpPr>
+        <p:spPr/>
+        <p:txBody>
+          <a:bodyPr/>
+          <a:lstStyle/>
+          <a:p>
+            <a:r>
+              <a:rPr lang="en-US" dirty="0"/>
+              <a:t>Use Cases</a:t>
+            </a:r>
+            <a:endParaRPr lang="en-IN" dirty="0"/>
+          </a:p>
+        </p:txBody>
+      </p:sp>
+      <p:sp>
+        <p:nvSpPr>
+          <p:cNvPr id="3" name="Content Placeholder 2">
+            <a:extLst>
+              <a:ext uri="{FF2B5EF4-FFF2-40B4-BE49-F238E27FC236}">
+                <a16:creationId xmlns:a16="http://schemas.microsoft.com/office/drawing/2014/main" id="{DF9F187D-CC91-60D1-6A40-2CBDFF18329B}"/>
+              </a:ext>
+            </a:extLst>
+          </p:cNvPr>
+          <p:cNvSpPr>
+            <a:spLocks noGrp="1"/>
+          </p:cNvSpPr>
+          <p:nvPr>
+            <p:ph idx="1"/>
+          </p:nvPr>
+        </p:nvSpPr>
+        <p:spPr/>
+        <p:txBody>
+          <a:bodyPr>
+            <a:normAutofit fontScale="92500" lnSpcReduction="10000"/>
+          </a:bodyPr>
+          <a:lstStyle/>
+          <a:p>
+            <a:endParaRPr lang="en-US" dirty="0"/>
+          </a:p>
+          <a:p>
+            <a:r>
+              <a:rPr lang="en-US" dirty="0"/>
+              <a:t>Build: Use this when you want to compile only the changes made since the last build, providing a quicker compilation process.</a:t>
+            </a:r>
+          </a:p>
+          <a:p>
+            <a:endParaRPr lang="en-US" dirty="0"/>
+          </a:p>
+          <a:p>
+            <a:r>
+              <a:rPr lang="en-US" dirty="0"/>
+              <a:t>Rebuild: Use this when you want to perform a clean build of the entire project, ensuring that all files are recompiled from scratch. This can be helpful if you suspect issues related to the build process.</a:t>
+            </a:r>
+          </a:p>
+          <a:p>
+            <a:endParaRPr lang="en-US" dirty="0"/>
+          </a:p>
+          <a:p>
+            <a:r>
+              <a:rPr lang="en-US" dirty="0"/>
+              <a:t>Clean: Use this when you want to remove all previously compiled files without initiating a build. This can be useful when you want to start with a clean slate without actually rebuilding the project.</a:t>
+            </a:r>
+            <a:endParaRPr lang="en-IN" dirty="0"/>
+          </a:p>
+        </p:txBody>
+      </p:sp>
+    </p:spTree>
+    <p:extLst>
+      <p:ext uri="{BB962C8B-B14F-4D97-AF65-F5344CB8AC3E}">
+        <p14:creationId xmlns:p14="http://schemas.microsoft.com/office/powerpoint/2010/main" val="2010768185"/>
+      </p:ext>
+    </p:extLst>
+  </p:cSld>
+  <p:clrMapOvr>
+    <a:masterClrMapping/>
+  </p:clrMapOvr>
+</p:sld>
+</file>
+
+<file path=ppt/slides/slide29.xml><?xml version="1.0" encoding="utf-8"?>
+<p:sld xmlns:a="http://schemas.openxmlformats.org/drawingml/2006/main" xmlns:r="http://schemas.openxmlformats.org/officeDocument/2006/relationships" xmlns:p="http://schemas.openxmlformats.org/presentationml/2006/main">
+  <p:cSld>
+    <p:spTree>
+      <p:nvGrpSpPr>
+        <p:cNvPr id="1" name=""/>
+        <p:cNvGrpSpPr/>
+        <p:nvPr/>
+      </p:nvGrpSpPr>
+      <p:grpSpPr>
+        <a:xfrm>
+          <a:off x="0" y="0"/>
+          <a:ext cx="0" cy="0"/>
+          <a:chOff x="0" y="0"/>
+          <a:chExt cx="0" cy="0"/>
+        </a:xfrm>
+      </p:grpSpPr>
+      <p:sp>
+        <p:nvSpPr>
+          <p:cNvPr id="2" name="Title 1">
+            <a:extLst>
+              <a:ext uri="{FF2B5EF4-FFF2-40B4-BE49-F238E27FC236}">
+                <a16:creationId xmlns:a16="http://schemas.microsoft.com/office/drawing/2014/main" id="{60CA7DFC-8DED-645D-AC86-B44EC91DF6AF}"/>
+              </a:ext>
+            </a:extLst>
+          </p:cNvPr>
+          <p:cNvSpPr>
+            <a:spLocks noGrp="1"/>
+          </p:cNvSpPr>
+          <p:nvPr>
+            <p:ph type="title"/>
+          </p:nvPr>
+        </p:nvSpPr>
+        <p:spPr/>
+        <p:txBody>
+          <a:bodyPr/>
+          <a:lstStyle/>
+          <a:p>
+            <a:r>
+              <a:rPr lang="en-US" dirty="0"/>
+              <a:t>what is solution explorer  in vs ?</a:t>
+            </a:r>
+            <a:br>
+              <a:rPr lang="en-US" dirty="0"/>
+            </a:br>
+            <a:endParaRPr lang="en-IN" dirty="0"/>
+          </a:p>
+        </p:txBody>
+      </p:sp>
+      <p:sp>
+        <p:nvSpPr>
+          <p:cNvPr id="3" name="Content Placeholder 2">
+            <a:extLst>
+              <a:ext uri="{FF2B5EF4-FFF2-40B4-BE49-F238E27FC236}">
+                <a16:creationId xmlns:a16="http://schemas.microsoft.com/office/drawing/2014/main" id="{E64EBFC9-9E4E-AE32-7AC1-EDB5B2527ECC}"/>
+              </a:ext>
+            </a:extLst>
+          </p:cNvPr>
+          <p:cNvSpPr>
+            <a:spLocks noGrp="1"/>
+          </p:cNvSpPr>
+          <p:nvPr>
+            <p:ph idx="1"/>
+          </p:nvPr>
+        </p:nvSpPr>
+        <p:spPr/>
+        <p:txBody>
+          <a:bodyPr/>
+          <a:lstStyle/>
+          <a:p>
+            <a:r>
+              <a:rPr lang="en-US" dirty="0"/>
+              <a:t>In Visual Studio, the Solution Explorer is a tool window that provides a hierarchical view of the files, projects, and solutions within your current development environment. It offers a structured representation of the components of your solution, making it easy to navigate, manage, and organize your code and related files.</a:t>
+            </a:r>
+            <a:endParaRPr lang="en-IN" dirty="0"/>
+          </a:p>
+        </p:txBody>
+      </p:sp>
+    </p:spTree>
+    <p:extLst>
+      <p:ext uri="{BB962C8B-B14F-4D97-AF65-F5344CB8AC3E}">
+        <p14:creationId xmlns:p14="http://schemas.microsoft.com/office/powerpoint/2010/main" val="1902141598"/>
       </p:ext>
     </p:extLst>
   </p:cSld>
@@ -6487,7 +6774,7 @@
         </p:blipFill>
         <p:spPr>
           <a:xfrm>
-            <a:off x="6857999" y="1558231"/>
+            <a:off x="7109925" y="1380950"/>
             <a:ext cx="4760891" cy="4442437"/>
           </a:xfrm>
           <a:prstGeom prst="rect">

</xml_diff>